<commit_message>
cc - rebuild site
</commit_message>
<xml_diff>
--- a/_static/images/logos/logos.pptx
+++ b/_static/images/logos/logos.pptx
@@ -5,12 +5,13 @@
     <p:sldMasterId id="2147483648" r:id="rId1"/>
   </p:sldMasterIdLst>
   <p:notesMasterIdLst>
-    <p:notesMasterId r:id="rId5"/>
+    <p:notesMasterId r:id="rId6"/>
   </p:notesMasterIdLst>
   <p:sldIdLst>
     <p:sldId id="1985" r:id="rId2"/>
     <p:sldId id="2003" r:id="rId3"/>
     <p:sldId id="2004" r:id="rId4"/>
+    <p:sldId id="2005" r:id="rId5"/>
   </p:sldIdLst>
   <p:sldSz cx="12192000" cy="6858000"/>
   <p:notesSz cx="6858000" cy="9144000"/>
@@ -236,7 +237,7 @@
           <a:p>
             <a:fld id="{DA6F54EE-2FE2-4E5A-8BEE-748F35900387}" type="datetimeFigureOut">
               <a:rPr lang="en-US" smtClean="0"/>
-              <a:t>9/4/2024</a:t>
+              <a:t>11/30/25</a:t>
             </a:fld>
             <a:endParaRPr lang="en-US"/>
           </a:p>
@@ -650,7 +651,7 @@
           <a:p>
             <a:fld id="{69179019-D65C-4D1E-82A4-728C848C8432}" type="datetimeFigureOut">
               <a:rPr lang="en-US" smtClean="0"/>
-              <a:t>9/4/2024</a:t>
+              <a:t>11/30/25</a:t>
             </a:fld>
             <a:endParaRPr lang="en-US"/>
           </a:p>
@@ -848,7 +849,7 @@
           <a:p>
             <a:fld id="{69179019-D65C-4D1E-82A4-728C848C8432}" type="datetimeFigureOut">
               <a:rPr lang="en-US" smtClean="0"/>
-              <a:t>9/4/2024</a:t>
+              <a:t>11/30/25</a:t>
             </a:fld>
             <a:endParaRPr lang="en-US"/>
           </a:p>
@@ -1056,7 +1057,7 @@
           <a:p>
             <a:fld id="{69179019-D65C-4D1E-82A4-728C848C8432}" type="datetimeFigureOut">
               <a:rPr lang="en-US" smtClean="0"/>
-              <a:t>9/4/2024</a:t>
+              <a:t>11/30/25</a:t>
             </a:fld>
             <a:endParaRPr lang="en-US"/>
           </a:p>
@@ -1254,7 +1255,7 @@
           <a:p>
             <a:fld id="{69179019-D65C-4D1E-82A4-728C848C8432}" type="datetimeFigureOut">
               <a:rPr lang="en-US" smtClean="0"/>
-              <a:t>9/4/2024</a:t>
+              <a:t>11/30/25</a:t>
             </a:fld>
             <a:endParaRPr lang="en-US"/>
           </a:p>
@@ -1529,7 +1530,7 @@
           <a:p>
             <a:fld id="{69179019-D65C-4D1E-82A4-728C848C8432}" type="datetimeFigureOut">
               <a:rPr lang="en-US" smtClean="0"/>
-              <a:t>9/4/2024</a:t>
+              <a:t>11/30/25</a:t>
             </a:fld>
             <a:endParaRPr lang="en-US"/>
           </a:p>
@@ -1794,7 +1795,7 @@
           <a:p>
             <a:fld id="{69179019-D65C-4D1E-82A4-728C848C8432}" type="datetimeFigureOut">
               <a:rPr lang="en-US" smtClean="0"/>
-              <a:t>9/4/2024</a:t>
+              <a:t>11/30/25</a:t>
             </a:fld>
             <a:endParaRPr lang="en-US"/>
           </a:p>
@@ -2206,7 +2207,7 @@
           <a:p>
             <a:fld id="{69179019-D65C-4D1E-82A4-728C848C8432}" type="datetimeFigureOut">
               <a:rPr lang="en-US" smtClean="0"/>
-              <a:t>9/4/2024</a:t>
+              <a:t>11/30/25</a:t>
             </a:fld>
             <a:endParaRPr lang="en-US"/>
           </a:p>
@@ -2347,7 +2348,7 @@
           <a:p>
             <a:fld id="{69179019-D65C-4D1E-82A4-728C848C8432}" type="datetimeFigureOut">
               <a:rPr lang="en-US" smtClean="0"/>
-              <a:t>9/4/2024</a:t>
+              <a:t>11/30/25</a:t>
             </a:fld>
             <a:endParaRPr lang="en-US"/>
           </a:p>
@@ -2460,7 +2461,7 @@
           <a:p>
             <a:fld id="{69179019-D65C-4D1E-82A4-728C848C8432}" type="datetimeFigureOut">
               <a:rPr lang="en-US" smtClean="0"/>
-              <a:t>9/4/2024</a:t>
+              <a:t>11/30/25</a:t>
             </a:fld>
             <a:endParaRPr lang="en-US"/>
           </a:p>
@@ -2771,7 +2772,7 @@
           <a:p>
             <a:fld id="{69179019-D65C-4D1E-82A4-728C848C8432}" type="datetimeFigureOut">
               <a:rPr lang="en-US" smtClean="0"/>
-              <a:t>9/4/2024</a:t>
+              <a:t>11/30/25</a:t>
             </a:fld>
             <a:endParaRPr lang="en-US"/>
           </a:p>
@@ -3059,7 +3060,7 @@
           <a:p>
             <a:fld id="{69179019-D65C-4D1E-82A4-728C848C8432}" type="datetimeFigureOut">
               <a:rPr lang="en-US" smtClean="0"/>
-              <a:t>9/4/2024</a:t>
+              <a:t>11/30/25</a:t>
             </a:fld>
             <a:endParaRPr lang="en-US"/>
           </a:p>
@@ -3300,7 +3301,7 @@
           <a:p>
             <a:fld id="{69179019-D65C-4D1E-82A4-728C848C8432}" type="datetimeFigureOut">
               <a:rPr lang="en-US" smtClean="0"/>
-              <a:t>9/4/2024</a:t>
+              <a:t>11/30/25</a:t>
             </a:fld>
             <a:endParaRPr lang="en-US"/>
           </a:p>
@@ -14003,8 +14004,8 @@
           <a:chExt cx="0" cy="0"/>
         </a:xfrm>
       </p:grpSpPr>
-      <mc:AlternateContent xmlns:mc="http://schemas.openxmlformats.org/markup-compatibility/2006">
-        <mc:Choice xmlns:a14="http://schemas.microsoft.com/office/drawing/2010/main" Requires="a14">
+      <mc:AlternateContent xmlns:mc="http://schemas.openxmlformats.org/markup-compatibility/2006" xmlns:a14="http://schemas.microsoft.com/office/drawing/2010/main">
+        <mc:Choice Requires="a14">
           <p:sp>
             <p:nvSpPr>
               <p:cNvPr id="2" name="TextBox 1">
@@ -14261,7 +14262,7 @@
             </p:txBody>
           </p:sp>
         </mc:Choice>
-        <mc:Fallback>
+        <mc:Fallback xmlns="">
           <p:sp>
             <p:nvSpPr>
               <p:cNvPr id="2" name="TextBox 1">
@@ -35099,6 +35100,238 @@
 </p:sld>
 </file>
 
+<file path=ppt/slides/slide4.xml><?xml version="1.0" encoding="utf-8"?>
+<p:sld xmlns:a="http://schemas.openxmlformats.org/drawingml/2006/main" xmlns:r="http://schemas.openxmlformats.org/officeDocument/2006/relationships" xmlns:p="http://schemas.openxmlformats.org/presentationml/2006/main">
+  <p:cSld>
+    <p:spTree>
+      <p:nvGrpSpPr>
+        <p:cNvPr id="1" name="">
+          <a:extLst>
+            <a:ext uri="{FF2B5EF4-FFF2-40B4-BE49-F238E27FC236}">
+              <a16:creationId xmlns:a16="http://schemas.microsoft.com/office/drawing/2014/main" id="{935634C9-5EBF-C122-64C5-7DA5919FE848}"/>
+            </a:ext>
+          </a:extLst>
+        </p:cNvPr>
+        <p:cNvGrpSpPr/>
+        <p:nvPr/>
+      </p:nvGrpSpPr>
+      <p:grpSpPr>
+        <a:xfrm>
+          <a:off x="0" y="0"/>
+          <a:ext cx="0" cy="0"/>
+          <a:chOff x="0" y="0"/>
+          <a:chExt cx="0" cy="0"/>
+        </a:xfrm>
+      </p:grpSpPr>
+      <p:grpSp>
+        <p:nvGrpSpPr>
+          <p:cNvPr id="198" name="Group 197">
+            <a:extLst>
+              <a:ext uri="{FF2B5EF4-FFF2-40B4-BE49-F238E27FC236}">
+                <a16:creationId xmlns:a16="http://schemas.microsoft.com/office/drawing/2014/main" id="{79BEAE51-561C-F1E5-302F-549E25CFF483}"/>
+              </a:ext>
+            </a:extLst>
+          </p:cNvPr>
+          <p:cNvGrpSpPr/>
+          <p:nvPr/>
+        </p:nvGrpSpPr>
+        <p:grpSpPr>
+          <a:xfrm>
+            <a:off x="4831586" y="502008"/>
+            <a:ext cx="5931448" cy="5931448"/>
+            <a:chOff x="4831586" y="502008"/>
+            <a:chExt cx="5931448" cy="5931448"/>
+          </a:xfrm>
+        </p:grpSpPr>
+        <p:sp>
+          <p:nvSpPr>
+            <p:cNvPr id="10" name="TextBox 9">
+              <a:extLst>
+                <a:ext uri="{FF2B5EF4-FFF2-40B4-BE49-F238E27FC236}">
+                  <a16:creationId xmlns:a16="http://schemas.microsoft.com/office/drawing/2014/main" id="{306F91B6-A132-C8FF-A6AA-82598092A7E6}"/>
+                </a:ext>
+              </a:extLst>
+            </p:cNvPr>
+            <p:cNvSpPr txBox="1"/>
+            <p:nvPr/>
+          </p:nvSpPr>
+          <p:spPr>
+            <a:xfrm>
+              <a:off x="4982314" y="1858871"/>
+              <a:ext cx="5606173" cy="3170099"/>
+            </a:xfrm>
+            <a:prstGeom prst="rect">
+              <a:avLst/>
+            </a:prstGeom>
+            <a:noFill/>
+          </p:spPr>
+          <p:txBody>
+            <a:bodyPr wrap="square" rIns="0" rtlCol="0">
+              <a:spAutoFit/>
+            </a:bodyPr>
+            <a:lstStyle/>
+            <a:p>
+              <a:r>
+                <a:rPr lang="en-US" sz="20000" i="1" dirty="0">
+                  <a:gradFill>
+                    <a:gsLst>
+                      <a:gs pos="50000">
+                        <a:srgbClr val="3D576E"/>
+                      </a:gs>
+                      <a:gs pos="0">
+                        <a:srgbClr val="3D576E"/>
+                      </a:gs>
+                      <a:gs pos="100000">
+                        <a:srgbClr val="A72A2A"/>
+                      </a:gs>
+                    </a:gsLst>
+                    <a:lin ang="5400000" scaled="1"/>
+                  </a:gradFill>
+                  <a:latin typeface="Bodoni MT" panose="02070603080606020203" pitchFamily="18" charset="0"/>
+                </a:rPr>
+                <a:t>mdof</a:t>
+              </a:r>
+            </a:p>
+          </p:txBody>
+        </p:sp>
+        <p:pic>
+          <p:nvPicPr>
+            <p:cNvPr id="134" name="Picture 133" descr="A blue sound wave on a black background&#10;&#10;Description automatically generated">
+              <a:extLst>
+                <a:ext uri="{FF2B5EF4-FFF2-40B4-BE49-F238E27FC236}">
+                  <a16:creationId xmlns:a16="http://schemas.microsoft.com/office/drawing/2014/main" id="{50BE3340-A3BA-3461-75EA-17D4C1F95E62}"/>
+                </a:ext>
+              </a:extLst>
+            </p:cNvPr>
+            <p:cNvPicPr>
+              <a:picLocks noChangeAspect="1"/>
+            </p:cNvPicPr>
+            <p:nvPr/>
+          </p:nvPicPr>
+          <p:blipFill>
+            <a:blip r:embed="rId2">
+              <a:extLst>
+                <a:ext uri="{28A0092B-C50C-407E-A947-70E740481C1C}">
+                  <a14:useLocalDpi xmlns:a14="http://schemas.microsoft.com/office/drawing/2010/main" val="0"/>
+                </a:ext>
+              </a:extLst>
+            </a:blip>
+            <a:srcRect l="13804"/>
+            <a:stretch>
+              <a:fillRect/>
+            </a:stretch>
+          </p:blipFill>
+          <p:spPr>
+            <a:xfrm>
+              <a:off x="5088835" y="1688048"/>
+              <a:ext cx="3241490" cy="1740952"/>
+            </a:xfrm>
+            <a:prstGeom prst="rect">
+              <a:avLst/>
+            </a:prstGeom>
+          </p:spPr>
+        </p:pic>
+        <p:pic>
+          <p:nvPicPr>
+            <p:cNvPr id="135" name="Picture 134" descr="A red line on a black background&#10;&#10;Description automatically generated">
+              <a:extLst>
+                <a:ext uri="{FF2B5EF4-FFF2-40B4-BE49-F238E27FC236}">
+                  <a16:creationId xmlns:a16="http://schemas.microsoft.com/office/drawing/2014/main" id="{98EA2A44-5947-2F2C-2B31-CB947FD2B9DE}"/>
+                </a:ext>
+              </a:extLst>
+            </p:cNvPr>
+            <p:cNvPicPr>
+              <a:picLocks noChangeAspect="1"/>
+            </p:cNvPicPr>
+            <p:nvPr/>
+          </p:nvPicPr>
+          <p:blipFill rotWithShape="1">
+            <a:blip r:embed="rId3">
+              <a:extLst>
+                <a:ext uri="{28A0092B-C50C-407E-A947-70E740481C1C}">
+                  <a14:useLocalDpi xmlns:a14="http://schemas.microsoft.com/office/drawing/2010/main" val="0"/>
+                </a:ext>
+              </a:extLst>
+            </a:blip>
+            <a:srcRect l="6901" t="30939" r="6901" b="24451"/>
+            <a:stretch>
+              <a:fillRect/>
+            </a:stretch>
+          </p:blipFill>
+          <p:spPr>
+            <a:xfrm flipH="1">
+              <a:off x="6107692" y="4399722"/>
+              <a:ext cx="3241490" cy="776626"/>
+            </a:xfrm>
+            <a:prstGeom prst="rect">
+              <a:avLst/>
+            </a:prstGeom>
+          </p:spPr>
+        </p:pic>
+        <p:sp>
+          <p:nvSpPr>
+            <p:cNvPr id="197" name="Rectangle 196">
+              <a:extLst>
+                <a:ext uri="{FF2B5EF4-FFF2-40B4-BE49-F238E27FC236}">
+                  <a16:creationId xmlns:a16="http://schemas.microsoft.com/office/drawing/2014/main" id="{53CB974A-9018-CD0B-0968-6B9DBC93D4BD}"/>
+                </a:ext>
+              </a:extLst>
+            </p:cNvPr>
+            <p:cNvSpPr/>
+            <p:nvPr/>
+          </p:nvSpPr>
+          <p:spPr>
+            <a:xfrm>
+              <a:off x="4831586" y="502008"/>
+              <a:ext cx="5931448" cy="5931448"/>
+            </a:xfrm>
+            <a:prstGeom prst="rect">
+              <a:avLst/>
+            </a:prstGeom>
+            <a:noFill/>
+            <a:ln>
+              <a:noFill/>
+            </a:ln>
+          </p:spPr>
+          <p:style>
+            <a:lnRef idx="2">
+              <a:schemeClr val="accent1">
+                <a:shade val="15000"/>
+              </a:schemeClr>
+            </a:lnRef>
+            <a:fillRef idx="1">
+              <a:schemeClr val="accent1"/>
+            </a:fillRef>
+            <a:effectRef idx="0">
+              <a:schemeClr val="accent1"/>
+            </a:effectRef>
+            <a:fontRef idx="minor">
+              <a:schemeClr val="lt1"/>
+            </a:fontRef>
+          </p:style>
+          <p:txBody>
+            <a:bodyPr rtlCol="0" anchor="ctr"/>
+            <a:lstStyle/>
+            <a:p>
+              <a:pPr algn="ctr"/>
+              <a:endParaRPr lang="en-US"/>
+            </a:p>
+          </p:txBody>
+        </p:sp>
+      </p:grpSp>
+    </p:spTree>
+    <p:extLst>
+      <p:ext uri="{BB962C8B-B14F-4D97-AF65-F5344CB8AC3E}">
+        <p14:creationId xmlns:p14="http://schemas.microsoft.com/office/powerpoint/2010/main" val="2738776092"/>
+      </p:ext>
+    </p:extLst>
+  </p:cSld>
+  <p:clrMapOvr>
+    <a:masterClrMapping/>
+  </p:clrMapOvr>
+</p:sld>
+</file>
+
 <file path=ppt/theme/theme1.xml><?xml version="1.0" encoding="utf-8"?>
 <a:theme xmlns:a="http://schemas.openxmlformats.org/drawingml/2006/main" name="Office Theme">
   <a:themeElements>

</xml_diff>